<commit_message>
Update project 4 web101
</commit_message>
<xml_diff>
--- a/WEB101x_02_VN Xây dựng website đầu tiên/Phần 4 - Quản trị website/Project 4 - Xây dựng website hoàn chỉnh/images/Presentation1.pptx
+++ b/WEB101x_02_VN Xây dựng website đầu tiên/Phần 4 - Quản trị website/Project 4 - Xây dựng website hoàn chỉnh/images/Presentation1.pptx
@@ -4,12 +4,25 @@
   <p:sldMasterIdLst>
     <p:sldMasterId id="2147483660" r:id="rId1"/>
   </p:sldMasterIdLst>
+  <p:notesMasterIdLst>
+    <p:notesMasterId r:id="rId17"/>
+  </p:notesMasterIdLst>
   <p:sldIdLst>
     <p:sldId id="258" r:id="rId2"/>
     <p:sldId id="261" r:id="rId3"/>
     <p:sldId id="262" r:id="rId4"/>
     <p:sldId id="259" r:id="rId5"/>
     <p:sldId id="260" r:id="rId6"/>
+    <p:sldId id="263" r:id="rId7"/>
+    <p:sldId id="264" r:id="rId8"/>
+    <p:sldId id="265" r:id="rId9"/>
+    <p:sldId id="266" r:id="rId10"/>
+    <p:sldId id="267" r:id="rId11"/>
+    <p:sldId id="268" r:id="rId12"/>
+    <p:sldId id="269" r:id="rId13"/>
+    <p:sldId id="270" r:id="rId14"/>
+    <p:sldId id="271" r:id="rId15"/>
+    <p:sldId id="272" r:id="rId16"/>
   </p:sldIdLst>
   <p:sldSz cx="13716000" cy="6858000"/>
   <p:notesSz cx="6858000" cy="9144000"/>
@@ -108,7 +121,491 @@
       </a:defRPr>
     </a:lvl9pPr>
   </p:defaultTextStyle>
+  <p:extLst>
+    <p:ext uri="{521415D9-36F7-43E2-AB2F-B90AF26B5E84}">
+      <p14:sectionLst xmlns:p14="http://schemas.microsoft.com/office/powerpoint/2010/main">
+        <p14:section name="slide show" id="{E3401733-773F-430F-AC10-219868840180}">
+          <p14:sldIdLst>
+            <p14:sldId id="258"/>
+            <p14:sldId id="261"/>
+            <p14:sldId id="262"/>
+            <p14:sldId id="259"/>
+            <p14:sldId id="260"/>
+          </p14:sldIdLst>
+        </p14:section>
+        <p14:section name="southern" id="{D2DD1577-AF70-4DB0-BB06-F08D2D71399E}">
+          <p14:sldIdLst>
+            <p14:sldId id="263"/>
+            <p14:sldId id="264"/>
+            <p14:sldId id="265"/>
+            <p14:sldId id="266"/>
+            <p14:sldId id="267"/>
+            <p14:sldId id="268"/>
+          </p14:sldIdLst>
+        </p14:section>
+        <p14:section name="nothern" id="{4769B295-AB2C-43C9-B719-1076AB75DA9F}">
+          <p14:sldIdLst>
+            <p14:sldId id="269"/>
+            <p14:sldId id="270"/>
+            <p14:sldId id="271"/>
+            <p14:sldId id="272"/>
+          </p14:sldIdLst>
+        </p14:section>
+      </p14:sectionLst>
+    </p:ext>
+    <p:ext uri="{EFAFB233-063F-42B5-8137-9DF3F51BA10A}">
+      <p15:sldGuideLst xmlns:p15="http://schemas.microsoft.com/office/powerpoint/2012/main"/>
+    </p:ext>
+  </p:extLst>
 </p:presentation>
+</file>
+
+<file path=ppt/commentAuthors.xml><?xml version="1.0" encoding="utf-8"?>
+<p:cmAuthorLst xmlns:a="http://schemas.openxmlformats.org/drawingml/2006/main" xmlns:r="http://schemas.openxmlformats.org/officeDocument/2006/relationships" xmlns:p="http://schemas.openxmlformats.org/presentationml/2006/main">
+  <p:cmAuthor id="1" name="minh tran" initials="mt" lastIdx="1" clrIdx="0">
+    <p:extLst>
+      <p:ext uri="{19B8F6BF-5375-455C-9EA6-DF929625EA0E}">
+        <p15:presenceInfo xmlns:p15="http://schemas.microsoft.com/office/powerpoint/2012/main" userId="11697c9e60c66b50" providerId="Windows Live"/>
+      </p:ext>
+    </p:extLst>
+  </p:cmAuthor>
+</p:cmAuthorLst>
+</file>
+
+<file path=ppt/notesMasters/notesMaster1.xml><?xml version="1.0" encoding="utf-8"?>
+<p:notesMaster xmlns:a="http://schemas.openxmlformats.org/drawingml/2006/main" xmlns:r="http://schemas.openxmlformats.org/officeDocument/2006/relationships" xmlns:p="http://schemas.openxmlformats.org/presentationml/2006/main">
+  <p:cSld>
+    <p:bg>
+      <p:bgRef idx="1001">
+        <a:schemeClr val="bg1"/>
+      </p:bgRef>
+    </p:bg>
+    <p:spTree>
+      <p:nvGrpSpPr>
+        <p:cNvPr id="1" name=""/>
+        <p:cNvGrpSpPr/>
+        <p:nvPr/>
+      </p:nvGrpSpPr>
+      <p:grpSpPr>
+        <a:xfrm>
+          <a:off x="0" y="0"/>
+          <a:ext cx="0" cy="0"/>
+          <a:chOff x="0" y="0"/>
+          <a:chExt cx="0" cy="0"/>
+        </a:xfrm>
+      </p:grpSpPr>
+      <p:sp>
+        <p:nvSpPr>
+          <p:cNvPr id="2" name="Header Placeholder 1"/>
+          <p:cNvSpPr>
+            <a:spLocks noGrp="1"/>
+          </p:cNvSpPr>
+          <p:nvPr>
+            <p:ph type="hdr" sz="quarter"/>
+          </p:nvPr>
+        </p:nvSpPr>
+        <p:spPr>
+          <a:xfrm>
+            <a:off x="0" y="0"/>
+            <a:ext cx="2971800" cy="458788"/>
+          </a:xfrm>
+          <a:prstGeom prst="rect">
+            <a:avLst/>
+          </a:prstGeom>
+        </p:spPr>
+        <p:txBody>
+          <a:bodyPr vert="horz" lIns="91440" tIns="45720" rIns="91440" bIns="45720" rtlCol="0"/>
+          <a:lstStyle>
+            <a:lvl1pPr algn="l">
+              <a:defRPr sz="1200"/>
+            </a:lvl1pPr>
+          </a:lstStyle>
+          <a:p>
+            <a:endParaRPr lang="en-US"/>
+          </a:p>
+        </p:txBody>
+      </p:sp>
+      <p:sp>
+        <p:nvSpPr>
+          <p:cNvPr id="3" name="Date Placeholder 2"/>
+          <p:cNvSpPr>
+            <a:spLocks noGrp="1"/>
+          </p:cNvSpPr>
+          <p:nvPr>
+            <p:ph type="dt" idx="1"/>
+          </p:nvPr>
+        </p:nvSpPr>
+        <p:spPr>
+          <a:xfrm>
+            <a:off x="3884613" y="0"/>
+            <a:ext cx="2971800" cy="458788"/>
+          </a:xfrm>
+          <a:prstGeom prst="rect">
+            <a:avLst/>
+          </a:prstGeom>
+        </p:spPr>
+        <p:txBody>
+          <a:bodyPr vert="horz" lIns="91440" tIns="45720" rIns="91440" bIns="45720" rtlCol="0"/>
+          <a:lstStyle>
+            <a:lvl1pPr algn="r">
+              <a:defRPr sz="1200"/>
+            </a:lvl1pPr>
+          </a:lstStyle>
+          <a:p>
+            <a:fld id="{36D6582C-1D2D-4730-8B0C-4BBF71FC7A07}" type="datetimeFigureOut">
+              <a:rPr lang="en-US" smtClean="0"/>
+              <a:t>23/01/22</a:t>
+            </a:fld>
+            <a:endParaRPr lang="en-US"/>
+          </a:p>
+        </p:txBody>
+      </p:sp>
+      <p:sp>
+        <p:nvSpPr>
+          <p:cNvPr id="4" name="Slide Image Placeholder 3"/>
+          <p:cNvSpPr>
+            <a:spLocks noGrp="1" noRot="1" noChangeAspect="1"/>
+          </p:cNvSpPr>
+          <p:nvPr>
+            <p:ph type="sldImg" idx="2"/>
+          </p:nvPr>
+        </p:nvSpPr>
+        <p:spPr>
+          <a:xfrm>
+            <a:off x="342900" y="1143000"/>
+            <a:ext cx="6172200" cy="3086100"/>
+          </a:xfrm>
+          <a:prstGeom prst="rect">
+            <a:avLst/>
+          </a:prstGeom>
+          <a:noFill/>
+          <a:ln w="12700">
+            <a:solidFill>
+              <a:prstClr val="black"/>
+            </a:solidFill>
+          </a:ln>
+        </p:spPr>
+        <p:txBody>
+          <a:bodyPr vert="horz" lIns="91440" tIns="45720" rIns="91440" bIns="45720" rtlCol="0" anchor="ctr"/>
+          <a:lstStyle/>
+          <a:p>
+            <a:endParaRPr lang="en-US"/>
+          </a:p>
+        </p:txBody>
+      </p:sp>
+      <p:sp>
+        <p:nvSpPr>
+          <p:cNvPr id="5" name="Notes Placeholder 4"/>
+          <p:cNvSpPr>
+            <a:spLocks noGrp="1"/>
+          </p:cNvSpPr>
+          <p:nvPr>
+            <p:ph type="body" sz="quarter" idx="3"/>
+          </p:nvPr>
+        </p:nvSpPr>
+        <p:spPr>
+          <a:xfrm>
+            <a:off x="685800" y="4400550"/>
+            <a:ext cx="5486400" cy="3600450"/>
+          </a:xfrm>
+          <a:prstGeom prst="rect">
+            <a:avLst/>
+          </a:prstGeom>
+        </p:spPr>
+        <p:txBody>
+          <a:bodyPr vert="horz" lIns="91440" tIns="45720" rIns="91440" bIns="45720" rtlCol="0"/>
+          <a:lstStyle/>
+          <a:p>
+            <a:pPr lvl="0"/>
+            <a:r>
+              <a:rPr lang="en-US"/>
+              <a:t>Click to edit Master text styles</a:t>
+            </a:r>
+          </a:p>
+          <a:p>
+            <a:pPr lvl="1"/>
+            <a:r>
+              <a:rPr lang="en-US"/>
+              <a:t>Second level</a:t>
+            </a:r>
+          </a:p>
+          <a:p>
+            <a:pPr lvl="2"/>
+            <a:r>
+              <a:rPr lang="en-US"/>
+              <a:t>Third level</a:t>
+            </a:r>
+          </a:p>
+          <a:p>
+            <a:pPr lvl="3"/>
+            <a:r>
+              <a:rPr lang="en-US"/>
+              <a:t>Fourth level</a:t>
+            </a:r>
+          </a:p>
+          <a:p>
+            <a:pPr lvl="4"/>
+            <a:r>
+              <a:rPr lang="en-US"/>
+              <a:t>Fifth level</a:t>
+            </a:r>
+          </a:p>
+        </p:txBody>
+      </p:sp>
+      <p:sp>
+        <p:nvSpPr>
+          <p:cNvPr id="6" name="Footer Placeholder 5"/>
+          <p:cNvSpPr>
+            <a:spLocks noGrp="1"/>
+          </p:cNvSpPr>
+          <p:nvPr>
+            <p:ph type="ftr" sz="quarter" idx="4"/>
+          </p:nvPr>
+        </p:nvSpPr>
+        <p:spPr>
+          <a:xfrm>
+            <a:off x="0" y="8685213"/>
+            <a:ext cx="2971800" cy="458787"/>
+          </a:xfrm>
+          <a:prstGeom prst="rect">
+            <a:avLst/>
+          </a:prstGeom>
+        </p:spPr>
+        <p:txBody>
+          <a:bodyPr vert="horz" lIns="91440" tIns="45720" rIns="91440" bIns="45720" rtlCol="0" anchor="b"/>
+          <a:lstStyle>
+            <a:lvl1pPr algn="l">
+              <a:defRPr sz="1200"/>
+            </a:lvl1pPr>
+          </a:lstStyle>
+          <a:p>
+            <a:endParaRPr lang="en-US"/>
+          </a:p>
+        </p:txBody>
+      </p:sp>
+      <p:sp>
+        <p:nvSpPr>
+          <p:cNvPr id="7" name="Slide Number Placeholder 6"/>
+          <p:cNvSpPr>
+            <a:spLocks noGrp="1"/>
+          </p:cNvSpPr>
+          <p:nvPr>
+            <p:ph type="sldNum" sz="quarter" idx="5"/>
+          </p:nvPr>
+        </p:nvSpPr>
+        <p:spPr>
+          <a:xfrm>
+            <a:off x="3884613" y="8685213"/>
+            <a:ext cx="2971800" cy="458787"/>
+          </a:xfrm>
+          <a:prstGeom prst="rect">
+            <a:avLst/>
+          </a:prstGeom>
+        </p:spPr>
+        <p:txBody>
+          <a:bodyPr vert="horz" lIns="91440" tIns="45720" rIns="91440" bIns="45720" rtlCol="0" anchor="b"/>
+          <a:lstStyle>
+            <a:lvl1pPr algn="r">
+              <a:defRPr sz="1200"/>
+            </a:lvl1pPr>
+          </a:lstStyle>
+          <a:p>
+            <a:fld id="{029A9561-4801-4184-9D2F-3925A5B9FC58}" type="slidenum">
+              <a:rPr lang="en-US" smtClean="0"/>
+              <a:t>‹#›</a:t>
+            </a:fld>
+            <a:endParaRPr lang="en-US"/>
+          </a:p>
+        </p:txBody>
+      </p:sp>
+    </p:spTree>
+    <p:extLst>
+      <p:ext uri="{BB962C8B-B14F-4D97-AF65-F5344CB8AC3E}">
+        <p14:creationId xmlns:p14="http://schemas.microsoft.com/office/powerpoint/2010/main" val="174187909"/>
+      </p:ext>
+    </p:extLst>
+  </p:cSld>
+  <p:clrMap bg1="lt1" tx1="dk1" bg2="lt2" tx2="dk2" accent1="accent1" accent2="accent2" accent3="accent3" accent4="accent4" accent5="accent5" accent6="accent6" hlink="hlink" folHlink="folHlink"/>
+  <p:notesStyle>
+    <a:lvl1pPr marL="0" algn="l" defTabSz="914400" rtl="0" eaLnBrk="1" latinLnBrk="0" hangingPunct="1">
+      <a:defRPr sz="1200" kern="1200">
+        <a:solidFill>
+          <a:schemeClr val="tx1"/>
+        </a:solidFill>
+        <a:latin typeface="+mn-lt"/>
+        <a:ea typeface="+mn-ea"/>
+        <a:cs typeface="+mn-cs"/>
+      </a:defRPr>
+    </a:lvl1pPr>
+    <a:lvl2pPr marL="457200" algn="l" defTabSz="914400" rtl="0" eaLnBrk="1" latinLnBrk="0" hangingPunct="1">
+      <a:defRPr sz="1200" kern="1200">
+        <a:solidFill>
+          <a:schemeClr val="tx1"/>
+        </a:solidFill>
+        <a:latin typeface="+mn-lt"/>
+        <a:ea typeface="+mn-ea"/>
+        <a:cs typeface="+mn-cs"/>
+      </a:defRPr>
+    </a:lvl2pPr>
+    <a:lvl3pPr marL="914400" algn="l" defTabSz="914400" rtl="0" eaLnBrk="1" latinLnBrk="0" hangingPunct="1">
+      <a:defRPr sz="1200" kern="1200">
+        <a:solidFill>
+          <a:schemeClr val="tx1"/>
+        </a:solidFill>
+        <a:latin typeface="+mn-lt"/>
+        <a:ea typeface="+mn-ea"/>
+        <a:cs typeface="+mn-cs"/>
+      </a:defRPr>
+    </a:lvl3pPr>
+    <a:lvl4pPr marL="1371600" algn="l" defTabSz="914400" rtl="0" eaLnBrk="1" latinLnBrk="0" hangingPunct="1">
+      <a:defRPr sz="1200" kern="1200">
+        <a:solidFill>
+          <a:schemeClr val="tx1"/>
+        </a:solidFill>
+        <a:latin typeface="+mn-lt"/>
+        <a:ea typeface="+mn-ea"/>
+        <a:cs typeface="+mn-cs"/>
+      </a:defRPr>
+    </a:lvl4pPr>
+    <a:lvl5pPr marL="1828800" algn="l" defTabSz="914400" rtl="0" eaLnBrk="1" latinLnBrk="0" hangingPunct="1">
+      <a:defRPr sz="1200" kern="1200">
+        <a:solidFill>
+          <a:schemeClr val="tx1"/>
+        </a:solidFill>
+        <a:latin typeface="+mn-lt"/>
+        <a:ea typeface="+mn-ea"/>
+        <a:cs typeface="+mn-cs"/>
+      </a:defRPr>
+    </a:lvl5pPr>
+    <a:lvl6pPr marL="2286000" algn="l" defTabSz="914400" rtl="0" eaLnBrk="1" latinLnBrk="0" hangingPunct="1">
+      <a:defRPr sz="1200" kern="1200">
+        <a:solidFill>
+          <a:schemeClr val="tx1"/>
+        </a:solidFill>
+        <a:latin typeface="+mn-lt"/>
+        <a:ea typeface="+mn-ea"/>
+        <a:cs typeface="+mn-cs"/>
+      </a:defRPr>
+    </a:lvl6pPr>
+    <a:lvl7pPr marL="2743200" algn="l" defTabSz="914400" rtl="0" eaLnBrk="1" latinLnBrk="0" hangingPunct="1">
+      <a:defRPr sz="1200" kern="1200">
+        <a:solidFill>
+          <a:schemeClr val="tx1"/>
+        </a:solidFill>
+        <a:latin typeface="+mn-lt"/>
+        <a:ea typeface="+mn-ea"/>
+        <a:cs typeface="+mn-cs"/>
+      </a:defRPr>
+    </a:lvl7pPr>
+    <a:lvl8pPr marL="3200400" algn="l" defTabSz="914400" rtl="0" eaLnBrk="1" latinLnBrk="0" hangingPunct="1">
+      <a:defRPr sz="1200" kern="1200">
+        <a:solidFill>
+          <a:schemeClr val="tx1"/>
+        </a:solidFill>
+        <a:latin typeface="+mn-lt"/>
+        <a:ea typeface="+mn-ea"/>
+        <a:cs typeface="+mn-cs"/>
+      </a:defRPr>
+    </a:lvl8pPr>
+    <a:lvl9pPr marL="3657600" algn="l" defTabSz="914400" rtl="0" eaLnBrk="1" latinLnBrk="0" hangingPunct="1">
+      <a:defRPr sz="1200" kern="1200">
+        <a:solidFill>
+          <a:schemeClr val="tx1"/>
+        </a:solidFill>
+        <a:latin typeface="+mn-lt"/>
+        <a:ea typeface="+mn-ea"/>
+        <a:cs typeface="+mn-cs"/>
+      </a:defRPr>
+    </a:lvl9pPr>
+  </p:notesStyle>
+</p:notesMaster>
+</file>
+
+<file path=ppt/notesSlides/notesSlide1.xml><?xml version="1.0" encoding="utf-8"?>
+<p:notes xmlns:a="http://schemas.openxmlformats.org/drawingml/2006/main" xmlns:r="http://schemas.openxmlformats.org/officeDocument/2006/relationships" xmlns:p="http://schemas.openxmlformats.org/presentationml/2006/main">
+  <p:cSld>
+    <p:spTree>
+      <p:nvGrpSpPr>
+        <p:cNvPr id="1" name=""/>
+        <p:cNvGrpSpPr/>
+        <p:nvPr/>
+      </p:nvGrpSpPr>
+      <p:grpSpPr>
+        <a:xfrm>
+          <a:off x="0" y="0"/>
+          <a:ext cx="0" cy="0"/>
+          <a:chOff x="0" y="0"/>
+          <a:chExt cx="0" cy="0"/>
+        </a:xfrm>
+      </p:grpSpPr>
+      <p:sp>
+        <p:nvSpPr>
+          <p:cNvPr id="2" name="Slide Image Placeholder 1"/>
+          <p:cNvSpPr>
+            <a:spLocks noGrp="1" noRot="1" noChangeAspect="1"/>
+          </p:cNvSpPr>
+          <p:nvPr>
+            <p:ph type="sldImg"/>
+          </p:nvPr>
+        </p:nvSpPr>
+        <p:spPr/>
+      </p:sp>
+      <p:sp>
+        <p:nvSpPr>
+          <p:cNvPr id="3" name="Notes Placeholder 2"/>
+          <p:cNvSpPr>
+            <a:spLocks noGrp="1"/>
+          </p:cNvSpPr>
+          <p:nvPr>
+            <p:ph type="body" idx="1"/>
+          </p:nvPr>
+        </p:nvSpPr>
+        <p:spPr/>
+        <p:txBody>
+          <a:bodyPr/>
+          <a:lstStyle/>
+          <a:p>
+            <a:r>
+              <a:rPr lang="en-US" dirty="0"/>
+              <a:t>Ho chi minh city</a:t>
+            </a:r>
+          </a:p>
+        </p:txBody>
+      </p:sp>
+      <p:sp>
+        <p:nvSpPr>
+          <p:cNvPr id="4" name="Slide Number Placeholder 3"/>
+          <p:cNvSpPr>
+            <a:spLocks noGrp="1"/>
+          </p:cNvSpPr>
+          <p:nvPr>
+            <p:ph type="sldNum" sz="quarter" idx="5"/>
+          </p:nvPr>
+        </p:nvSpPr>
+        <p:spPr/>
+        <p:txBody>
+          <a:bodyPr/>
+          <a:lstStyle/>
+          <a:p>
+            <a:fld id="{029A9561-4801-4184-9D2F-3925A5B9FC58}" type="slidenum">
+              <a:rPr lang="en-US" smtClean="0"/>
+              <a:t>6</a:t>
+            </a:fld>
+            <a:endParaRPr lang="en-US"/>
+          </a:p>
+        </p:txBody>
+      </p:sp>
+    </p:spTree>
+    <p:extLst>
+      <p:ext uri="{BB962C8B-B14F-4D97-AF65-F5344CB8AC3E}">
+        <p14:creationId xmlns:p14="http://schemas.microsoft.com/office/powerpoint/2010/main" val="1365783122"/>
+      </p:ext>
+    </p:extLst>
+  </p:cSld>
+  <p:clrMapOvr>
+    <a:masterClrMapping/>
+  </p:clrMapOvr>
+</p:notes>
 </file>
 
 <file path=ppt/slideLayouts/slideLayout1.xml><?xml version="1.0" encoding="utf-8"?>
@@ -242,7 +739,7 @@
           <a:p>
             <a:fld id="{024061A7-AB50-4B00-959A-21E4580F42CC}" type="datetimeFigureOut">
               <a:rPr lang="en-US" smtClean="0"/>
-              <a:t>17/01/22</a:t>
+              <a:t>23/01/22</a:t>
             </a:fld>
             <a:endParaRPr lang="en-US"/>
           </a:p>
@@ -412,7 +909,7 @@
           <a:p>
             <a:fld id="{024061A7-AB50-4B00-959A-21E4580F42CC}" type="datetimeFigureOut">
               <a:rPr lang="en-US" smtClean="0"/>
-              <a:t>17/01/22</a:t>
+              <a:t>23/01/22</a:t>
             </a:fld>
             <a:endParaRPr lang="en-US"/>
           </a:p>
@@ -592,7 +1089,7 @@
           <a:p>
             <a:fld id="{024061A7-AB50-4B00-959A-21E4580F42CC}" type="datetimeFigureOut">
               <a:rPr lang="en-US" smtClean="0"/>
-              <a:t>17/01/22</a:t>
+              <a:t>23/01/22</a:t>
             </a:fld>
             <a:endParaRPr lang="en-US"/>
           </a:p>
@@ -762,7 +1259,7 @@
           <a:p>
             <a:fld id="{024061A7-AB50-4B00-959A-21E4580F42CC}" type="datetimeFigureOut">
               <a:rPr lang="en-US" smtClean="0"/>
-              <a:t>17/01/22</a:t>
+              <a:t>23/01/22</a:t>
             </a:fld>
             <a:endParaRPr lang="en-US"/>
           </a:p>
@@ -1008,7 +1505,7 @@
           <a:p>
             <a:fld id="{024061A7-AB50-4B00-959A-21E4580F42CC}" type="datetimeFigureOut">
               <a:rPr lang="en-US" smtClean="0"/>
-              <a:t>17/01/22</a:t>
+              <a:t>23/01/22</a:t>
             </a:fld>
             <a:endParaRPr lang="en-US"/>
           </a:p>
@@ -1240,7 +1737,7 @@
           <a:p>
             <a:fld id="{024061A7-AB50-4B00-959A-21E4580F42CC}" type="datetimeFigureOut">
               <a:rPr lang="en-US" smtClean="0"/>
-              <a:t>17/01/22</a:t>
+              <a:t>23/01/22</a:t>
             </a:fld>
             <a:endParaRPr lang="en-US"/>
           </a:p>
@@ -1607,7 +2104,7 @@
           <a:p>
             <a:fld id="{024061A7-AB50-4B00-959A-21E4580F42CC}" type="datetimeFigureOut">
               <a:rPr lang="en-US" smtClean="0"/>
-              <a:t>17/01/22</a:t>
+              <a:t>23/01/22</a:t>
             </a:fld>
             <a:endParaRPr lang="en-US"/>
           </a:p>
@@ -1725,7 +2222,7 @@
           <a:p>
             <a:fld id="{024061A7-AB50-4B00-959A-21E4580F42CC}" type="datetimeFigureOut">
               <a:rPr lang="en-US" smtClean="0"/>
-              <a:t>17/01/22</a:t>
+              <a:t>23/01/22</a:t>
             </a:fld>
             <a:endParaRPr lang="en-US"/>
           </a:p>
@@ -1820,7 +2317,7 @@
           <a:p>
             <a:fld id="{024061A7-AB50-4B00-959A-21E4580F42CC}" type="datetimeFigureOut">
               <a:rPr lang="en-US" smtClean="0"/>
-              <a:t>17/01/22</a:t>
+              <a:t>23/01/22</a:t>
             </a:fld>
             <a:endParaRPr lang="en-US"/>
           </a:p>
@@ -2097,7 +2594,7 @@
           <a:p>
             <a:fld id="{024061A7-AB50-4B00-959A-21E4580F42CC}" type="datetimeFigureOut">
               <a:rPr lang="en-US" smtClean="0"/>
-              <a:t>17/01/22</a:t>
+              <a:t>23/01/22</a:t>
             </a:fld>
             <a:endParaRPr lang="en-US"/>
           </a:p>
@@ -2354,7 +2851,7 @@
           <a:p>
             <a:fld id="{024061A7-AB50-4B00-959A-21E4580F42CC}" type="datetimeFigureOut">
               <a:rPr lang="en-US" smtClean="0"/>
-              <a:t>17/01/22</a:t>
+              <a:t>23/01/22</a:t>
             </a:fld>
             <a:endParaRPr lang="en-US"/>
           </a:p>
@@ -2567,7 +3064,7 @@
           <a:p>
             <a:fld id="{024061A7-AB50-4B00-959A-21E4580F42CC}" type="datetimeFigureOut">
               <a:rPr lang="en-US" smtClean="0"/>
-              <a:t>17/01/22</a:t>
+              <a:t>23/01/22</a:t>
             </a:fld>
             <a:endParaRPr lang="en-US"/>
           </a:p>
@@ -3129,6 +3626,324 @@
 </p:sld>
 </file>
 
+<file path=ppt/slides/slide10.xml><?xml version="1.0" encoding="utf-8"?>
+<p:sld xmlns:a="http://schemas.openxmlformats.org/drawingml/2006/main" xmlns:r="http://schemas.openxmlformats.org/officeDocument/2006/relationships" xmlns:p="http://schemas.openxmlformats.org/presentationml/2006/main">
+  <p:cSld>
+    <p:bg>
+      <p:bgPr>
+        <a:solidFill>
+          <a:srgbClr val="FFC000"/>
+        </a:solidFill>
+        <a:effectLst/>
+      </p:bgPr>
+    </p:bg>
+    <p:spTree>
+      <p:nvGrpSpPr>
+        <p:cNvPr id="1" name=""/>
+        <p:cNvGrpSpPr/>
+        <p:nvPr/>
+      </p:nvGrpSpPr>
+      <p:grpSpPr>
+        <a:xfrm>
+          <a:off x="0" y="0"/>
+          <a:ext cx="0" cy="0"/>
+          <a:chOff x="0" y="0"/>
+          <a:chExt cx="0" cy="0"/>
+        </a:xfrm>
+      </p:grpSpPr>
+      <p:pic>
+        <p:nvPicPr>
+          <p:cNvPr id="5122" name="Picture 2" descr="Du lịch miền nam- du lịch miền tây- cảnh đẹp miền tây-Bến Ninh Kiều về đêm- biểu tượng của thành phố Cần Thơ. Ảnh: Nguyễn Xuân Hãn">
+            <a:extLst>
+              <a:ext uri="{FF2B5EF4-FFF2-40B4-BE49-F238E27FC236}">
+                <a16:creationId xmlns:a16="http://schemas.microsoft.com/office/drawing/2014/main" id="{9DCCBF59-5C32-4A0F-9157-EEE836A74E6E}"/>
+              </a:ext>
+            </a:extLst>
+          </p:cNvPr>
+          <p:cNvPicPr>
+            <a:picLocks noChangeAspect="1" noChangeArrowheads="1"/>
+          </p:cNvPicPr>
+          <p:nvPr/>
+        </p:nvPicPr>
+        <p:blipFill rotWithShape="1">
+          <a:blip r:embed="rId2">
+            <a:extLst>
+              <a:ext uri="{28A0092B-C50C-407E-A947-70E740481C1C}">
+                <a14:useLocalDpi xmlns:a14="http://schemas.microsoft.com/office/drawing/2010/main" val="0"/>
+              </a:ext>
+            </a:extLst>
+          </a:blip>
+          <a:srcRect t="8226" b="754"/>
+          <a:stretch/>
+        </p:blipFill>
+        <p:spPr bwMode="auto">
+          <a:xfrm>
+            <a:off x="2095504" y="750096"/>
+            <a:ext cx="9524992" cy="5357808"/>
+          </a:xfrm>
+          <a:prstGeom prst="rect">
+            <a:avLst/>
+          </a:prstGeom>
+          <a:noFill/>
+          <a:extLst>
+            <a:ext uri="{909E8E84-426E-40DD-AFC4-6F175D3DCCD1}">
+              <a14:hiddenFill xmlns:a14="http://schemas.microsoft.com/office/drawing/2010/main">
+                <a:solidFill>
+                  <a:srgbClr val="FFFFFF"/>
+                </a:solidFill>
+              </a14:hiddenFill>
+            </a:ext>
+          </a:extLst>
+        </p:spPr>
+      </p:pic>
+    </p:spTree>
+    <p:extLst>
+      <p:ext uri="{BB962C8B-B14F-4D97-AF65-F5344CB8AC3E}">
+        <p14:creationId xmlns:p14="http://schemas.microsoft.com/office/powerpoint/2010/main" val="4126838151"/>
+      </p:ext>
+    </p:extLst>
+  </p:cSld>
+  <p:clrMapOvr>
+    <a:masterClrMapping/>
+  </p:clrMapOvr>
+</p:sld>
+</file>
+
+<file path=ppt/slides/slide11.xml><?xml version="1.0" encoding="utf-8"?>
+<p:sld xmlns:a="http://schemas.openxmlformats.org/drawingml/2006/main" xmlns:r="http://schemas.openxmlformats.org/officeDocument/2006/relationships" xmlns:p="http://schemas.openxmlformats.org/presentationml/2006/main">
+  <p:cSld>
+    <p:bg>
+      <p:bgPr>
+        <a:solidFill>
+          <a:srgbClr val="FFC000"/>
+        </a:solidFill>
+        <a:effectLst/>
+      </p:bgPr>
+    </p:bg>
+    <p:spTree>
+      <p:nvGrpSpPr>
+        <p:cNvPr id="1" name=""/>
+        <p:cNvGrpSpPr/>
+        <p:nvPr/>
+      </p:nvGrpSpPr>
+      <p:grpSpPr>
+        <a:xfrm>
+          <a:off x="0" y="0"/>
+          <a:ext cx="0" cy="0"/>
+          <a:chOff x="0" y="0"/>
+          <a:chExt cx="0" cy="0"/>
+        </a:xfrm>
+      </p:grpSpPr>
+      <p:pic>
+        <p:nvPicPr>
+          <p:cNvPr id="6146" name="Picture 2" descr="Du lịch miền nam- du lịch miền tây- cảnh đẹp miền tây-Đảo Nam Du nổi tiếng ở Kiên Giang. Ảnh: Delta Tran">
+            <a:extLst>
+              <a:ext uri="{FF2B5EF4-FFF2-40B4-BE49-F238E27FC236}">
+                <a16:creationId xmlns:a16="http://schemas.microsoft.com/office/drawing/2014/main" id="{98726CDB-EB61-43BE-B0C8-BC0F87BC6B08}"/>
+              </a:ext>
+            </a:extLst>
+          </p:cNvPr>
+          <p:cNvPicPr>
+            <a:picLocks noChangeAspect="1" noChangeArrowheads="1"/>
+          </p:cNvPicPr>
+          <p:nvPr/>
+        </p:nvPicPr>
+        <p:blipFill rotWithShape="1">
+          <a:blip r:embed="rId2">
+            <a:extLst>
+              <a:ext uri="{28A0092B-C50C-407E-A947-70E740481C1C}">
+                <a14:useLocalDpi xmlns:a14="http://schemas.microsoft.com/office/drawing/2010/main" val="0"/>
+              </a:ext>
+            </a:extLst>
+          </a:blip>
+          <a:srcRect l="4601" r="4601"/>
+          <a:stretch/>
+        </p:blipFill>
+        <p:spPr bwMode="auto">
+          <a:xfrm>
+            <a:off x="2429936" y="938214"/>
+            <a:ext cx="8856128" cy="4981572"/>
+          </a:xfrm>
+          <a:prstGeom prst="rect">
+            <a:avLst/>
+          </a:prstGeom>
+          <a:noFill/>
+          <a:extLst>
+            <a:ext uri="{909E8E84-426E-40DD-AFC4-6F175D3DCCD1}">
+              <a14:hiddenFill xmlns:a14="http://schemas.microsoft.com/office/drawing/2010/main">
+                <a:solidFill>
+                  <a:srgbClr val="FFFFFF"/>
+                </a:solidFill>
+              </a14:hiddenFill>
+            </a:ext>
+          </a:extLst>
+        </p:spPr>
+      </p:pic>
+    </p:spTree>
+    <p:extLst>
+      <p:ext uri="{BB962C8B-B14F-4D97-AF65-F5344CB8AC3E}">
+        <p14:creationId xmlns:p14="http://schemas.microsoft.com/office/powerpoint/2010/main" val="3270922404"/>
+      </p:ext>
+    </p:extLst>
+  </p:cSld>
+  <p:clrMapOvr>
+    <a:masterClrMapping/>
+  </p:clrMapOvr>
+</p:sld>
+</file>
+
+<file path=ppt/slides/slide12.xml><?xml version="1.0" encoding="utf-8"?>
+<p:sld xmlns:a="http://schemas.openxmlformats.org/drawingml/2006/main" xmlns:r="http://schemas.openxmlformats.org/officeDocument/2006/relationships" xmlns:p="http://schemas.openxmlformats.org/presentationml/2006/main">
+  <p:cSld>
+    <p:bg>
+      <p:bgPr>
+        <a:solidFill>
+          <a:srgbClr val="FFC000"/>
+        </a:solidFill>
+        <a:effectLst/>
+      </p:bgPr>
+    </p:bg>
+    <p:spTree>
+      <p:nvGrpSpPr>
+        <p:cNvPr id="1" name=""/>
+        <p:cNvGrpSpPr/>
+        <p:nvPr/>
+      </p:nvGrpSpPr>
+      <p:grpSpPr>
+        <a:xfrm>
+          <a:off x="0" y="0"/>
+          <a:ext cx="0" cy="0"/>
+          <a:chOff x="0" y="0"/>
+          <a:chExt cx="0" cy="0"/>
+        </a:xfrm>
+      </p:grpSpPr>
+    </p:spTree>
+    <p:extLst>
+      <p:ext uri="{BB962C8B-B14F-4D97-AF65-F5344CB8AC3E}">
+        <p14:creationId xmlns:p14="http://schemas.microsoft.com/office/powerpoint/2010/main" val="1625048483"/>
+      </p:ext>
+    </p:extLst>
+  </p:cSld>
+  <p:clrMapOvr>
+    <a:masterClrMapping/>
+  </p:clrMapOvr>
+</p:sld>
+</file>
+
+<file path=ppt/slides/slide13.xml><?xml version="1.0" encoding="utf-8"?>
+<p:sld xmlns:a="http://schemas.openxmlformats.org/drawingml/2006/main" xmlns:r="http://schemas.openxmlformats.org/officeDocument/2006/relationships" xmlns:p="http://schemas.openxmlformats.org/presentationml/2006/main">
+  <p:cSld>
+    <p:bg>
+      <p:bgPr>
+        <a:solidFill>
+          <a:srgbClr val="FFC000"/>
+        </a:solidFill>
+        <a:effectLst/>
+      </p:bgPr>
+    </p:bg>
+    <p:spTree>
+      <p:nvGrpSpPr>
+        <p:cNvPr id="1" name=""/>
+        <p:cNvGrpSpPr/>
+        <p:nvPr/>
+      </p:nvGrpSpPr>
+      <p:grpSpPr>
+        <a:xfrm>
+          <a:off x="0" y="0"/>
+          <a:ext cx="0" cy="0"/>
+          <a:chOff x="0" y="0"/>
+          <a:chExt cx="0" cy="0"/>
+        </a:xfrm>
+      </p:grpSpPr>
+    </p:spTree>
+    <p:extLst>
+      <p:ext uri="{BB962C8B-B14F-4D97-AF65-F5344CB8AC3E}">
+        <p14:creationId xmlns:p14="http://schemas.microsoft.com/office/powerpoint/2010/main" val="3202775824"/>
+      </p:ext>
+    </p:extLst>
+  </p:cSld>
+  <p:clrMapOvr>
+    <a:masterClrMapping/>
+  </p:clrMapOvr>
+</p:sld>
+</file>
+
+<file path=ppt/slides/slide14.xml><?xml version="1.0" encoding="utf-8"?>
+<p:sld xmlns:a="http://schemas.openxmlformats.org/drawingml/2006/main" xmlns:r="http://schemas.openxmlformats.org/officeDocument/2006/relationships" xmlns:p="http://schemas.openxmlformats.org/presentationml/2006/main">
+  <p:cSld>
+    <p:bg>
+      <p:bgPr>
+        <a:solidFill>
+          <a:srgbClr val="FFC000"/>
+        </a:solidFill>
+        <a:effectLst/>
+      </p:bgPr>
+    </p:bg>
+    <p:spTree>
+      <p:nvGrpSpPr>
+        <p:cNvPr id="1" name=""/>
+        <p:cNvGrpSpPr/>
+        <p:nvPr/>
+      </p:nvGrpSpPr>
+      <p:grpSpPr>
+        <a:xfrm>
+          <a:off x="0" y="0"/>
+          <a:ext cx="0" cy="0"/>
+          <a:chOff x="0" y="0"/>
+          <a:chExt cx="0" cy="0"/>
+        </a:xfrm>
+      </p:grpSpPr>
+    </p:spTree>
+    <p:extLst>
+      <p:ext uri="{BB962C8B-B14F-4D97-AF65-F5344CB8AC3E}">
+        <p14:creationId xmlns:p14="http://schemas.microsoft.com/office/powerpoint/2010/main" val="3454293041"/>
+      </p:ext>
+    </p:extLst>
+  </p:cSld>
+  <p:clrMapOvr>
+    <a:masterClrMapping/>
+  </p:clrMapOvr>
+</p:sld>
+</file>
+
+<file path=ppt/slides/slide15.xml><?xml version="1.0" encoding="utf-8"?>
+<p:sld xmlns:a="http://schemas.openxmlformats.org/drawingml/2006/main" xmlns:r="http://schemas.openxmlformats.org/officeDocument/2006/relationships" xmlns:p="http://schemas.openxmlformats.org/presentationml/2006/main">
+  <p:cSld>
+    <p:bg>
+      <p:bgPr>
+        <a:solidFill>
+          <a:srgbClr val="FFC000"/>
+        </a:solidFill>
+        <a:effectLst/>
+      </p:bgPr>
+    </p:bg>
+    <p:spTree>
+      <p:nvGrpSpPr>
+        <p:cNvPr id="1" name=""/>
+        <p:cNvGrpSpPr/>
+        <p:nvPr/>
+      </p:nvGrpSpPr>
+      <p:grpSpPr>
+        <a:xfrm>
+          <a:off x="0" y="0"/>
+          <a:ext cx="0" cy="0"/>
+          <a:chOff x="0" y="0"/>
+          <a:chExt cx="0" cy="0"/>
+        </a:xfrm>
+      </p:grpSpPr>
+    </p:spTree>
+    <p:extLst>
+      <p:ext uri="{BB962C8B-B14F-4D97-AF65-F5344CB8AC3E}">
+        <p14:creationId xmlns:p14="http://schemas.microsoft.com/office/powerpoint/2010/main" val="243215096"/>
+      </p:ext>
+    </p:extLst>
+  </p:cSld>
+  <p:clrMapOvr>
+    <a:masterClrMapping/>
+  </p:clrMapOvr>
+</p:sld>
+</file>
+
 <file path=ppt/slides/slide2.xml><?xml version="1.0" encoding="utf-8"?>
 <p:sld xmlns:a="http://schemas.openxmlformats.org/drawingml/2006/main" xmlns:r="http://schemas.openxmlformats.org/officeDocument/2006/relationships" xmlns:p="http://schemas.openxmlformats.org/presentationml/2006/main">
   <p:cSld>
@@ -3380,6 +4195,338 @@
     <p:extLst>
       <p:ext uri="{BB962C8B-B14F-4D97-AF65-F5344CB8AC3E}">
         <p14:creationId xmlns:p14="http://schemas.microsoft.com/office/powerpoint/2010/main" val="3243973288"/>
+      </p:ext>
+    </p:extLst>
+  </p:cSld>
+  <p:clrMapOvr>
+    <a:masterClrMapping/>
+  </p:clrMapOvr>
+</p:sld>
+</file>
+
+<file path=ppt/slides/slide6.xml><?xml version="1.0" encoding="utf-8"?>
+<p:sld xmlns:a="http://schemas.openxmlformats.org/drawingml/2006/main" xmlns:r="http://schemas.openxmlformats.org/officeDocument/2006/relationships" xmlns:p="http://schemas.openxmlformats.org/presentationml/2006/main">
+  <p:cSld>
+    <p:bg>
+      <p:bgPr>
+        <a:solidFill>
+          <a:srgbClr val="FFC000"/>
+        </a:solidFill>
+        <a:effectLst/>
+      </p:bgPr>
+    </p:bg>
+    <p:spTree>
+      <p:nvGrpSpPr>
+        <p:cNvPr id="1" name=""/>
+        <p:cNvGrpSpPr/>
+        <p:nvPr/>
+      </p:nvGrpSpPr>
+      <p:grpSpPr>
+        <a:xfrm>
+          <a:off x="0" y="0"/>
+          <a:ext cx="0" cy="0"/>
+          <a:chOff x="0" y="0"/>
+          <a:chExt cx="0" cy="0"/>
+        </a:xfrm>
+      </p:grpSpPr>
+      <p:pic>
+        <p:nvPicPr>
+          <p:cNvPr id="1026" name="Picture 2" descr="Du lịch miền nam- du lịch miền tây- cảnh đẹp miền tây-Tòa nhà Landmark 81. Ảnh: Đông Giang">
+            <a:extLst>
+              <a:ext uri="{FF2B5EF4-FFF2-40B4-BE49-F238E27FC236}">
+                <a16:creationId xmlns:a16="http://schemas.microsoft.com/office/drawing/2014/main" id="{13732A58-F7FB-43EB-8908-2D8C406A3E37}"/>
+              </a:ext>
+            </a:extLst>
+          </p:cNvPr>
+          <p:cNvPicPr>
+            <a:picLocks noChangeAspect="1" noChangeArrowheads="1"/>
+          </p:cNvPicPr>
+          <p:nvPr/>
+        </p:nvPicPr>
+        <p:blipFill rotWithShape="1">
+          <a:blip r:embed="rId3">
+            <a:extLst>
+              <a:ext uri="{28A0092B-C50C-407E-A947-70E740481C1C}">
+                <a14:useLocalDpi xmlns:a14="http://schemas.microsoft.com/office/drawing/2010/main" val="0"/>
+              </a:ext>
+            </a:extLst>
+          </a:blip>
+          <a:srcRect l="148" t="13790" r="-146" b="41210"/>
+          <a:stretch/>
+        </p:blipFill>
+        <p:spPr bwMode="auto">
+          <a:xfrm>
+            <a:off x="857784" y="871356"/>
+            <a:ext cx="9073294" cy="5103728"/>
+          </a:xfrm>
+          <a:prstGeom prst="rect">
+            <a:avLst/>
+          </a:prstGeom>
+          <a:noFill/>
+          <a:extLst>
+            <a:ext uri="{909E8E84-426E-40DD-AFC4-6F175D3DCCD1}">
+              <a14:hiddenFill xmlns:a14="http://schemas.microsoft.com/office/drawing/2010/main">
+                <a:solidFill>
+                  <a:srgbClr val="FFFFFF"/>
+                </a:solidFill>
+              </a14:hiddenFill>
+            </a:ext>
+          </a:extLst>
+        </p:spPr>
+      </p:pic>
+    </p:spTree>
+    <p:extLst>
+      <p:ext uri="{BB962C8B-B14F-4D97-AF65-F5344CB8AC3E}">
+        <p14:creationId xmlns:p14="http://schemas.microsoft.com/office/powerpoint/2010/main" val="3588569142"/>
+      </p:ext>
+    </p:extLst>
+  </p:cSld>
+  <p:clrMapOvr>
+    <a:masterClrMapping/>
+  </p:clrMapOvr>
+</p:sld>
+</file>
+
+<file path=ppt/slides/slide7.xml><?xml version="1.0" encoding="utf-8"?>
+<p:sld xmlns:a="http://schemas.openxmlformats.org/drawingml/2006/main" xmlns:r="http://schemas.openxmlformats.org/officeDocument/2006/relationships" xmlns:p="http://schemas.openxmlformats.org/presentationml/2006/main">
+  <p:cSld>
+    <p:bg>
+      <p:bgPr>
+        <a:solidFill>
+          <a:srgbClr val="FFC000"/>
+        </a:solidFill>
+        <a:effectLst/>
+      </p:bgPr>
+    </p:bg>
+    <p:spTree>
+      <p:nvGrpSpPr>
+        <p:cNvPr id="1" name=""/>
+        <p:cNvGrpSpPr/>
+        <p:nvPr/>
+      </p:nvGrpSpPr>
+      <p:grpSpPr>
+        <a:xfrm>
+          <a:off x="0" y="0"/>
+          <a:ext cx="0" cy="0"/>
+          <a:chOff x="0" y="0"/>
+          <a:chExt cx="0" cy="0"/>
+        </a:xfrm>
+      </p:grpSpPr>
+      <p:pic>
+        <p:nvPicPr>
+          <p:cNvPr id="2050" name="Picture 2" descr="Du lịch miền nam- du lịch miền tây- cảnh đẹp miền tây-Kiến trúc độc đáo của Tòa Thánh Tây Ninh">
+            <a:extLst>
+              <a:ext uri="{FF2B5EF4-FFF2-40B4-BE49-F238E27FC236}">
+                <a16:creationId xmlns:a16="http://schemas.microsoft.com/office/drawing/2014/main" id="{767FE72E-8AB3-4761-AE28-925C4834A567}"/>
+              </a:ext>
+            </a:extLst>
+          </p:cNvPr>
+          <p:cNvPicPr>
+            <a:picLocks noChangeAspect="1" noChangeArrowheads="1"/>
+          </p:cNvPicPr>
+          <p:nvPr/>
+        </p:nvPicPr>
+        <p:blipFill rotWithShape="1">
+          <a:blip r:embed="rId2">
+            <a:extLst>
+              <a:ext uri="{28A0092B-C50C-407E-A947-70E740481C1C}">
+                <a14:useLocalDpi xmlns:a14="http://schemas.microsoft.com/office/drawing/2010/main" val="0"/>
+              </a:ext>
+            </a:extLst>
+          </a:blip>
+          <a:srcRect t="802" b="24094"/>
+          <a:stretch/>
+        </p:blipFill>
+        <p:spPr bwMode="auto">
+          <a:xfrm>
+            <a:off x="196212" y="367545"/>
+            <a:ext cx="9156688" cy="5150637"/>
+          </a:xfrm>
+          <a:prstGeom prst="rect">
+            <a:avLst/>
+          </a:prstGeom>
+          <a:noFill/>
+          <a:extLst>
+            <a:ext uri="{909E8E84-426E-40DD-AFC4-6F175D3DCCD1}">
+              <a14:hiddenFill xmlns:a14="http://schemas.microsoft.com/office/drawing/2010/main">
+                <a:solidFill>
+                  <a:srgbClr val="FFFFFF"/>
+                </a:solidFill>
+              </a14:hiddenFill>
+            </a:ext>
+          </a:extLst>
+        </p:spPr>
+      </p:pic>
+    </p:spTree>
+    <p:extLst>
+      <p:ext uri="{BB962C8B-B14F-4D97-AF65-F5344CB8AC3E}">
+        <p14:creationId xmlns:p14="http://schemas.microsoft.com/office/powerpoint/2010/main" val="817418629"/>
+      </p:ext>
+    </p:extLst>
+  </p:cSld>
+  <p:clrMapOvr>
+    <a:masterClrMapping/>
+  </p:clrMapOvr>
+</p:sld>
+</file>
+
+<file path=ppt/slides/slide8.xml><?xml version="1.0" encoding="utf-8"?>
+<p:sld xmlns:a="http://schemas.openxmlformats.org/drawingml/2006/main" xmlns:r="http://schemas.openxmlformats.org/officeDocument/2006/relationships" xmlns:p="http://schemas.openxmlformats.org/presentationml/2006/main">
+  <p:cSld>
+    <p:bg>
+      <p:bgPr>
+        <a:solidFill>
+          <a:srgbClr val="FFC000"/>
+        </a:solidFill>
+        <a:effectLst/>
+      </p:bgPr>
+    </p:bg>
+    <p:spTree>
+      <p:nvGrpSpPr>
+        <p:cNvPr id="1" name=""/>
+        <p:cNvGrpSpPr/>
+        <p:nvPr/>
+      </p:nvGrpSpPr>
+      <p:grpSpPr>
+        <a:xfrm>
+          <a:off x="0" y="0"/>
+          <a:ext cx="0" cy="0"/>
+          <a:chOff x="0" y="0"/>
+          <a:chExt cx="0" cy="0"/>
+        </a:xfrm>
+      </p:grpSpPr>
+      <p:pic>
+        <p:nvPicPr>
+          <p:cNvPr id="4" name="Picture 2" descr="Du lịch miền nam- du lịch miền tây- cảnh đẹp miền tây-Dọc theo con đường Núi Lớn. Ảnh: @Lephuong1335.">
+            <a:extLst>
+              <a:ext uri="{FF2B5EF4-FFF2-40B4-BE49-F238E27FC236}">
+                <a16:creationId xmlns:a16="http://schemas.microsoft.com/office/drawing/2014/main" id="{13B875C8-792E-4663-8D5D-3A661F981094}"/>
+              </a:ext>
+            </a:extLst>
+          </p:cNvPr>
+          <p:cNvPicPr>
+            <a:picLocks noChangeAspect="1" noChangeArrowheads="1"/>
+          </p:cNvPicPr>
+          <p:nvPr/>
+        </p:nvPicPr>
+        <p:blipFill rotWithShape="1">
+          <a:blip r:embed="rId2">
+            <a:extLst>
+              <a:ext uri="{28A0092B-C50C-407E-A947-70E740481C1C}">
+                <a14:useLocalDpi xmlns:a14="http://schemas.microsoft.com/office/drawing/2010/main" val="0"/>
+              </a:ext>
+            </a:extLst>
+          </a:blip>
+          <a:srcRect t="35040" b="8710"/>
+          <a:stretch/>
+        </p:blipFill>
+        <p:spPr bwMode="auto">
+          <a:xfrm>
+            <a:off x="928868" y="585788"/>
+            <a:ext cx="9256853" cy="5206980"/>
+          </a:xfrm>
+          <a:prstGeom prst="rect">
+            <a:avLst/>
+          </a:prstGeom>
+          <a:noFill/>
+          <a:extLst>
+            <a:ext uri="{909E8E84-426E-40DD-AFC4-6F175D3DCCD1}">
+              <a14:hiddenFill xmlns:a14="http://schemas.microsoft.com/office/drawing/2010/main">
+                <a:solidFill>
+                  <a:srgbClr val="FFFFFF"/>
+                </a:solidFill>
+              </a14:hiddenFill>
+            </a:ext>
+          </a:extLst>
+        </p:spPr>
+      </p:pic>
+    </p:spTree>
+    <p:extLst>
+      <p:ext uri="{BB962C8B-B14F-4D97-AF65-F5344CB8AC3E}">
+        <p14:creationId xmlns:p14="http://schemas.microsoft.com/office/powerpoint/2010/main" val="1937493979"/>
+      </p:ext>
+    </p:extLst>
+  </p:cSld>
+  <p:clrMapOvr>
+    <a:masterClrMapping/>
+  </p:clrMapOvr>
+</p:sld>
+</file>
+
+<file path=ppt/slides/slide9.xml><?xml version="1.0" encoding="utf-8"?>
+<p:sld xmlns:a="http://schemas.openxmlformats.org/drawingml/2006/main" xmlns:r="http://schemas.openxmlformats.org/officeDocument/2006/relationships" xmlns:p="http://schemas.openxmlformats.org/presentationml/2006/main">
+  <p:cSld>
+    <p:bg>
+      <p:bgPr>
+        <a:solidFill>
+          <a:srgbClr val="FFC000"/>
+        </a:solidFill>
+        <a:effectLst/>
+      </p:bgPr>
+    </p:bg>
+    <p:spTree>
+      <p:nvGrpSpPr>
+        <p:cNvPr id="1" name=""/>
+        <p:cNvGrpSpPr/>
+        <p:nvPr/>
+      </p:nvGrpSpPr>
+      <p:grpSpPr>
+        <a:xfrm>
+          <a:off x="0" y="0"/>
+          <a:ext cx="0" cy="0"/>
+          <a:chOff x="0" y="0"/>
+          <a:chExt cx="0" cy="0"/>
+        </a:xfrm>
+      </p:grpSpPr>
+      <p:pic>
+        <p:nvPicPr>
+          <p:cNvPr id="4100" name="Picture 4" descr="Du lịch miền nam- du lịch miền tây- cảnh đẹp miền tây-Kiến trúc độc đáo chùa Khơ Me ở An Giang. Ảnh: Hòa Huy Ngô">
+            <a:extLst>
+              <a:ext uri="{FF2B5EF4-FFF2-40B4-BE49-F238E27FC236}">
+                <a16:creationId xmlns:a16="http://schemas.microsoft.com/office/drawing/2014/main" id="{80BD018D-A0DB-4219-8B6C-E0E0A258D035}"/>
+              </a:ext>
+            </a:extLst>
+          </p:cNvPr>
+          <p:cNvPicPr>
+            <a:picLocks noChangeAspect="1" noChangeArrowheads="1"/>
+          </p:cNvPicPr>
+          <p:nvPr/>
+        </p:nvPicPr>
+        <p:blipFill rotWithShape="1">
+          <a:blip r:embed="rId2">
+            <a:extLst>
+              <a:ext uri="{28A0092B-C50C-407E-A947-70E740481C1C}">
+                <a14:useLocalDpi xmlns:a14="http://schemas.microsoft.com/office/drawing/2010/main" val="0"/>
+              </a:ext>
+            </a:extLst>
+          </a:blip>
+          <a:srcRect l="1187" t="9283" r="9355" b="1259"/>
+          <a:stretch/>
+        </p:blipFill>
+        <p:spPr bwMode="auto">
+          <a:xfrm>
+            <a:off x="1981199" y="685800"/>
+            <a:ext cx="9917575" cy="5578636"/>
+          </a:xfrm>
+          <a:prstGeom prst="rect">
+            <a:avLst/>
+          </a:prstGeom>
+          <a:noFill/>
+          <a:extLst>
+            <a:ext uri="{909E8E84-426E-40DD-AFC4-6F175D3DCCD1}">
+              <a14:hiddenFill xmlns:a14="http://schemas.microsoft.com/office/drawing/2010/main">
+                <a:solidFill>
+                  <a:srgbClr val="FFFFFF"/>
+                </a:solidFill>
+              </a14:hiddenFill>
+            </a:ext>
+          </a:extLst>
+        </p:spPr>
+      </p:pic>
+    </p:spTree>
+    <p:extLst>
+      <p:ext uri="{BB962C8B-B14F-4D97-AF65-F5344CB8AC3E}">
+        <p14:creationId xmlns:p14="http://schemas.microsoft.com/office/powerpoint/2010/main" val="3123766179"/>
       </p:ext>
     </p:extLst>
   </p:cSld>
@@ -3648,4 +4795,299 @@
     </a:ext>
   </a:extLst>
 </a:theme>
+</file>
+
+<file path=ppt/theme/theme2.xml><?xml version="1.0" encoding="utf-8"?>
+<a:theme xmlns:a="http://schemas.openxmlformats.org/drawingml/2006/main" name="Office Theme">
+  <a:themeElements>
+    <a:clrScheme name="Office">
+      <a:dk1>
+        <a:sysClr val="windowText" lastClr="000000"/>
+      </a:dk1>
+      <a:lt1>
+        <a:sysClr val="window" lastClr="FFFFFF"/>
+      </a:lt1>
+      <a:dk2>
+        <a:srgbClr val="44546A"/>
+      </a:dk2>
+      <a:lt2>
+        <a:srgbClr val="E7E6E6"/>
+      </a:lt2>
+      <a:accent1>
+        <a:srgbClr val="4472C4"/>
+      </a:accent1>
+      <a:accent2>
+        <a:srgbClr val="ED7D31"/>
+      </a:accent2>
+      <a:accent3>
+        <a:srgbClr val="A5A5A5"/>
+      </a:accent3>
+      <a:accent4>
+        <a:srgbClr val="FFC000"/>
+      </a:accent4>
+      <a:accent5>
+        <a:srgbClr val="5B9BD5"/>
+      </a:accent5>
+      <a:accent6>
+        <a:srgbClr val="70AD47"/>
+      </a:accent6>
+      <a:hlink>
+        <a:srgbClr val="0563C1"/>
+      </a:hlink>
+      <a:folHlink>
+        <a:srgbClr val="954F72"/>
+      </a:folHlink>
+    </a:clrScheme>
+    <a:fontScheme name="Office">
+      <a:majorFont>
+        <a:latin typeface="Calibri Light" panose="020F0302020204030204"/>
+        <a:ea typeface=""/>
+        <a:cs typeface=""/>
+        <a:font script="Jpan" typeface="游ゴシック Light"/>
+        <a:font script="Hang" typeface="맑은 고딕"/>
+        <a:font script="Hans" typeface="等线 Light"/>
+        <a:font script="Hant" typeface="新細明體"/>
+        <a:font script="Arab" typeface="Times New Roman"/>
+        <a:font script="Hebr" typeface="Times New Roman"/>
+        <a:font script="Thai" typeface="Angsana New"/>
+        <a:font script="Ethi" typeface="Nyala"/>
+        <a:font script="Beng" typeface="Vrinda"/>
+        <a:font script="Gujr" typeface="Shruti"/>
+        <a:font script="Khmr" typeface="MoolBoran"/>
+        <a:font script="Knda" typeface="Tunga"/>
+        <a:font script="Guru" typeface="Raavi"/>
+        <a:font script="Cans" typeface="Euphemia"/>
+        <a:font script="Cher" typeface="Plantagenet Cherokee"/>
+        <a:font script="Yiii" typeface="Microsoft Yi Baiti"/>
+        <a:font script="Tibt" typeface="Microsoft Himalaya"/>
+        <a:font script="Thaa" typeface="MV Boli"/>
+        <a:font script="Deva" typeface="Mangal"/>
+        <a:font script="Telu" typeface="Gautami"/>
+        <a:font script="Taml" typeface="Latha"/>
+        <a:font script="Syrc" typeface="Estrangelo Edessa"/>
+        <a:font script="Orya" typeface="Kalinga"/>
+        <a:font script="Mlym" typeface="Kartika"/>
+        <a:font script="Laoo" typeface="DokChampa"/>
+        <a:font script="Sinh" typeface="Iskoola Pota"/>
+        <a:font script="Mong" typeface="Mongolian Baiti"/>
+        <a:font script="Viet" typeface="Times New Roman"/>
+        <a:font script="Uigh" typeface="Microsoft Uighur"/>
+        <a:font script="Geor" typeface="Sylfaen"/>
+        <a:font script="Armn" typeface="Arial"/>
+        <a:font script="Bugi" typeface="Leelawadee UI"/>
+        <a:font script="Bopo" typeface="Microsoft JhengHei"/>
+        <a:font script="Java" typeface="Javanese Text"/>
+        <a:font script="Lisu" typeface="Segoe UI"/>
+        <a:font script="Mymr" typeface="Myanmar Text"/>
+        <a:font script="Nkoo" typeface="Ebrima"/>
+        <a:font script="Olck" typeface="Nirmala UI"/>
+        <a:font script="Osma" typeface="Ebrima"/>
+        <a:font script="Phag" typeface="Phagspa"/>
+        <a:font script="Syrn" typeface="Estrangelo Edessa"/>
+        <a:font script="Syrj" typeface="Estrangelo Edessa"/>
+        <a:font script="Syre" typeface="Estrangelo Edessa"/>
+        <a:font script="Sora" typeface="Nirmala UI"/>
+        <a:font script="Tale" typeface="Microsoft Tai Le"/>
+        <a:font script="Talu" typeface="Microsoft New Tai Lue"/>
+        <a:font script="Tfng" typeface="Ebrima"/>
+      </a:majorFont>
+      <a:minorFont>
+        <a:latin typeface="Calibri" panose="020F0502020204030204"/>
+        <a:ea typeface=""/>
+        <a:cs typeface=""/>
+        <a:font script="Jpan" typeface="游ゴシック"/>
+        <a:font script="Hang" typeface="맑은 고딕"/>
+        <a:font script="Hans" typeface="等线"/>
+        <a:font script="Hant" typeface="新細明體"/>
+        <a:font script="Arab" typeface="Arial"/>
+        <a:font script="Hebr" typeface="Arial"/>
+        <a:font script="Thai" typeface="Cordia New"/>
+        <a:font script="Ethi" typeface="Nyala"/>
+        <a:font script="Beng" typeface="Vrinda"/>
+        <a:font script="Gujr" typeface="Shruti"/>
+        <a:font script="Khmr" typeface="DaunPenh"/>
+        <a:font script="Knda" typeface="Tunga"/>
+        <a:font script="Guru" typeface="Raavi"/>
+        <a:font script="Cans" typeface="Euphemia"/>
+        <a:font script="Cher" typeface="Plantagenet Cherokee"/>
+        <a:font script="Yiii" typeface="Microsoft Yi Baiti"/>
+        <a:font script="Tibt" typeface="Microsoft Himalaya"/>
+        <a:font script="Thaa" typeface="MV Boli"/>
+        <a:font script="Deva" typeface="Mangal"/>
+        <a:font script="Telu" typeface="Gautami"/>
+        <a:font script="Taml" typeface="Latha"/>
+        <a:font script="Syrc" typeface="Estrangelo Edessa"/>
+        <a:font script="Orya" typeface="Kalinga"/>
+        <a:font script="Mlym" typeface="Kartika"/>
+        <a:font script="Laoo" typeface="DokChampa"/>
+        <a:font script="Sinh" typeface="Iskoola Pota"/>
+        <a:font script="Mong" typeface="Mongolian Baiti"/>
+        <a:font script="Viet" typeface="Arial"/>
+        <a:font script="Uigh" typeface="Microsoft Uighur"/>
+        <a:font script="Geor" typeface="Sylfaen"/>
+        <a:font script="Armn" typeface="Arial"/>
+        <a:font script="Bugi" typeface="Leelawadee UI"/>
+        <a:font script="Bopo" typeface="Microsoft JhengHei"/>
+        <a:font script="Java" typeface="Javanese Text"/>
+        <a:font script="Lisu" typeface="Segoe UI"/>
+        <a:font script="Mymr" typeface="Myanmar Text"/>
+        <a:font script="Nkoo" typeface="Ebrima"/>
+        <a:font script="Olck" typeface="Nirmala UI"/>
+        <a:font script="Osma" typeface="Ebrima"/>
+        <a:font script="Phag" typeface="Phagspa"/>
+        <a:font script="Syrn" typeface="Estrangelo Edessa"/>
+        <a:font script="Syrj" typeface="Estrangelo Edessa"/>
+        <a:font script="Syre" typeface="Estrangelo Edessa"/>
+        <a:font script="Sora" typeface="Nirmala UI"/>
+        <a:font script="Tale" typeface="Microsoft Tai Le"/>
+        <a:font script="Talu" typeface="Microsoft New Tai Lue"/>
+        <a:font script="Tfng" typeface="Ebrima"/>
+      </a:minorFont>
+    </a:fontScheme>
+    <a:fmtScheme name="Office">
+      <a:fillStyleLst>
+        <a:solidFill>
+          <a:schemeClr val="phClr"/>
+        </a:solidFill>
+        <a:gradFill rotWithShape="1">
+          <a:gsLst>
+            <a:gs pos="0">
+              <a:schemeClr val="phClr">
+                <a:lumMod val="110000"/>
+                <a:satMod val="105000"/>
+                <a:tint val="67000"/>
+              </a:schemeClr>
+            </a:gs>
+            <a:gs pos="50000">
+              <a:schemeClr val="phClr">
+                <a:lumMod val="105000"/>
+                <a:satMod val="103000"/>
+                <a:tint val="73000"/>
+              </a:schemeClr>
+            </a:gs>
+            <a:gs pos="100000">
+              <a:schemeClr val="phClr">
+                <a:lumMod val="105000"/>
+                <a:satMod val="109000"/>
+                <a:tint val="81000"/>
+              </a:schemeClr>
+            </a:gs>
+          </a:gsLst>
+          <a:lin ang="5400000" scaled="0"/>
+        </a:gradFill>
+        <a:gradFill rotWithShape="1">
+          <a:gsLst>
+            <a:gs pos="0">
+              <a:schemeClr val="phClr">
+                <a:satMod val="103000"/>
+                <a:lumMod val="102000"/>
+                <a:tint val="94000"/>
+              </a:schemeClr>
+            </a:gs>
+            <a:gs pos="50000">
+              <a:schemeClr val="phClr">
+                <a:satMod val="110000"/>
+                <a:lumMod val="100000"/>
+                <a:shade val="100000"/>
+              </a:schemeClr>
+            </a:gs>
+            <a:gs pos="100000">
+              <a:schemeClr val="phClr">
+                <a:lumMod val="99000"/>
+                <a:satMod val="120000"/>
+                <a:shade val="78000"/>
+              </a:schemeClr>
+            </a:gs>
+          </a:gsLst>
+          <a:lin ang="5400000" scaled="0"/>
+        </a:gradFill>
+      </a:fillStyleLst>
+      <a:lnStyleLst>
+        <a:ln w="6350" cap="flat" cmpd="sng" algn="ctr">
+          <a:solidFill>
+            <a:schemeClr val="phClr"/>
+          </a:solidFill>
+          <a:prstDash val="solid"/>
+          <a:miter lim="800000"/>
+        </a:ln>
+        <a:ln w="12700" cap="flat" cmpd="sng" algn="ctr">
+          <a:solidFill>
+            <a:schemeClr val="phClr"/>
+          </a:solidFill>
+          <a:prstDash val="solid"/>
+          <a:miter lim="800000"/>
+        </a:ln>
+        <a:ln w="19050" cap="flat" cmpd="sng" algn="ctr">
+          <a:solidFill>
+            <a:schemeClr val="phClr"/>
+          </a:solidFill>
+          <a:prstDash val="solid"/>
+          <a:miter lim="800000"/>
+        </a:ln>
+      </a:lnStyleLst>
+      <a:effectStyleLst>
+        <a:effectStyle>
+          <a:effectLst/>
+        </a:effectStyle>
+        <a:effectStyle>
+          <a:effectLst/>
+        </a:effectStyle>
+        <a:effectStyle>
+          <a:effectLst>
+            <a:outerShdw blurRad="57150" dist="19050" dir="5400000" algn="ctr" rotWithShape="0">
+              <a:srgbClr val="000000">
+                <a:alpha val="63000"/>
+              </a:srgbClr>
+            </a:outerShdw>
+          </a:effectLst>
+        </a:effectStyle>
+      </a:effectStyleLst>
+      <a:bgFillStyleLst>
+        <a:solidFill>
+          <a:schemeClr val="phClr"/>
+        </a:solidFill>
+        <a:solidFill>
+          <a:schemeClr val="phClr">
+            <a:tint val="95000"/>
+            <a:satMod val="170000"/>
+          </a:schemeClr>
+        </a:solidFill>
+        <a:gradFill rotWithShape="1">
+          <a:gsLst>
+            <a:gs pos="0">
+              <a:schemeClr val="phClr">
+                <a:tint val="93000"/>
+                <a:satMod val="150000"/>
+                <a:shade val="98000"/>
+                <a:lumMod val="102000"/>
+              </a:schemeClr>
+            </a:gs>
+            <a:gs pos="50000">
+              <a:schemeClr val="phClr">
+                <a:tint val="98000"/>
+                <a:satMod val="130000"/>
+                <a:shade val="90000"/>
+                <a:lumMod val="103000"/>
+              </a:schemeClr>
+            </a:gs>
+            <a:gs pos="100000">
+              <a:schemeClr val="phClr">
+                <a:shade val="63000"/>
+                <a:satMod val="120000"/>
+              </a:schemeClr>
+            </a:gs>
+          </a:gsLst>
+          <a:lin ang="5400000" scaled="0"/>
+        </a:gradFill>
+      </a:bgFillStyleLst>
+    </a:fmtScheme>
+  </a:themeElements>
+  <a:objectDefaults/>
+  <a:extraClrSchemeLst/>
+  <a:extLst>
+    <a:ext uri="{05A4C25C-085E-4340-85A3-A5531E510DB2}">
+      <thm15:themeFamily xmlns:thm15="http://schemas.microsoft.com/office/thememl/2012/main" name="Office Theme" id="{62F939B6-93AF-4DB8-9C6B-D6C7DFDC589F}" vid="{4A3C46E8-61CC-4603-A589-7422A47A8E4A}"/>
+    </a:ext>
+  </a:extLst>
+</a:theme>
 </file>
</xml_diff>